<commit_message>
add some figure and ref changes
</commit_message>
<xml_diff>
--- a/figure/diffmap/diffmap.pptx
+++ b/figure/diffmap/diffmap.pptx
@@ -108,6 +108,11 @@
       </a:defRPr>
     </a:lvl9pPr>
   </p:defaultTextStyle>
+  <p:extLst>
+    <p:ext uri="{EFAFB233-063F-42B5-8137-9DF3F51BA10A}">
+      <p15:sldGuideLst xmlns:p15="http://schemas.microsoft.com/office/powerpoint/2012/main"/>
+    </p:ext>
+  </p:extLst>
 </p:presentation>
 </file>
 
@@ -242,7 +247,7 @@
           <a:p>
             <a:fld id="{AEEC718D-1538-450E-A1EF-13157973CE6E}" type="datetimeFigureOut">
               <a:rPr lang="zh-CN" altLang="en-US" smtClean="0"/>
-              <a:t>2022/2/22</a:t>
+              <a:t>2022/3/11</a:t>
             </a:fld>
             <a:endParaRPr lang="zh-CN" altLang="en-US"/>
           </a:p>
@@ -412,7 +417,7 @@
           <a:p>
             <a:fld id="{AEEC718D-1538-450E-A1EF-13157973CE6E}" type="datetimeFigureOut">
               <a:rPr lang="zh-CN" altLang="en-US" smtClean="0"/>
-              <a:t>2022/2/22</a:t>
+              <a:t>2022/3/11</a:t>
             </a:fld>
             <a:endParaRPr lang="zh-CN" altLang="en-US"/>
           </a:p>
@@ -592,7 +597,7 @@
           <a:p>
             <a:fld id="{AEEC718D-1538-450E-A1EF-13157973CE6E}" type="datetimeFigureOut">
               <a:rPr lang="zh-CN" altLang="en-US" smtClean="0"/>
-              <a:t>2022/2/22</a:t>
+              <a:t>2022/3/11</a:t>
             </a:fld>
             <a:endParaRPr lang="zh-CN" altLang="en-US"/>
           </a:p>
@@ -762,7 +767,7 @@
           <a:p>
             <a:fld id="{AEEC718D-1538-450E-A1EF-13157973CE6E}" type="datetimeFigureOut">
               <a:rPr lang="zh-CN" altLang="en-US" smtClean="0"/>
-              <a:t>2022/2/22</a:t>
+              <a:t>2022/3/11</a:t>
             </a:fld>
             <a:endParaRPr lang="zh-CN" altLang="en-US"/>
           </a:p>
@@ -1008,7 +1013,7 @@
           <a:p>
             <a:fld id="{AEEC718D-1538-450E-A1EF-13157973CE6E}" type="datetimeFigureOut">
               <a:rPr lang="zh-CN" altLang="en-US" smtClean="0"/>
-              <a:t>2022/2/22</a:t>
+              <a:t>2022/3/11</a:t>
             </a:fld>
             <a:endParaRPr lang="zh-CN" altLang="en-US"/>
           </a:p>
@@ -1240,7 +1245,7 @@
           <a:p>
             <a:fld id="{AEEC718D-1538-450E-A1EF-13157973CE6E}" type="datetimeFigureOut">
               <a:rPr lang="zh-CN" altLang="en-US" smtClean="0"/>
-              <a:t>2022/2/22</a:t>
+              <a:t>2022/3/11</a:t>
             </a:fld>
             <a:endParaRPr lang="zh-CN" altLang="en-US"/>
           </a:p>
@@ -1607,7 +1612,7 @@
           <a:p>
             <a:fld id="{AEEC718D-1538-450E-A1EF-13157973CE6E}" type="datetimeFigureOut">
               <a:rPr lang="zh-CN" altLang="en-US" smtClean="0"/>
-              <a:t>2022/2/22</a:t>
+              <a:t>2022/3/11</a:t>
             </a:fld>
             <a:endParaRPr lang="zh-CN" altLang="en-US"/>
           </a:p>
@@ -1725,7 +1730,7 @@
           <a:p>
             <a:fld id="{AEEC718D-1538-450E-A1EF-13157973CE6E}" type="datetimeFigureOut">
               <a:rPr lang="zh-CN" altLang="en-US" smtClean="0"/>
-              <a:t>2022/2/22</a:t>
+              <a:t>2022/3/11</a:t>
             </a:fld>
             <a:endParaRPr lang="zh-CN" altLang="en-US"/>
           </a:p>
@@ -1820,7 +1825,7 @@
           <a:p>
             <a:fld id="{AEEC718D-1538-450E-A1EF-13157973CE6E}" type="datetimeFigureOut">
               <a:rPr lang="zh-CN" altLang="en-US" smtClean="0"/>
-              <a:t>2022/2/22</a:t>
+              <a:t>2022/3/11</a:t>
             </a:fld>
             <a:endParaRPr lang="zh-CN" altLang="en-US"/>
           </a:p>
@@ -2097,7 +2102,7 @@
           <a:p>
             <a:fld id="{AEEC718D-1538-450E-A1EF-13157973CE6E}" type="datetimeFigureOut">
               <a:rPr lang="zh-CN" altLang="en-US" smtClean="0"/>
-              <a:t>2022/2/22</a:t>
+              <a:t>2022/3/11</a:t>
             </a:fld>
             <a:endParaRPr lang="zh-CN" altLang="en-US"/>
           </a:p>
@@ -2350,7 +2355,7 @@
           <a:p>
             <a:fld id="{AEEC718D-1538-450E-A1EF-13157973CE6E}" type="datetimeFigureOut">
               <a:rPr lang="zh-CN" altLang="en-US" smtClean="0"/>
-              <a:t>2022/2/22</a:t>
+              <a:t>2022/3/11</a:t>
             </a:fld>
             <a:endParaRPr lang="zh-CN" altLang="en-US"/>
           </a:p>
@@ -2563,7 +2568,7 @@
           <a:p>
             <a:fld id="{AEEC718D-1538-450E-A1EF-13157973CE6E}" type="datetimeFigureOut">
               <a:rPr lang="zh-CN" altLang="en-US" smtClean="0"/>
-              <a:t>2022/2/22</a:t>
+              <a:t>2022/3/11</a:t>
             </a:fld>
             <a:endParaRPr lang="zh-CN" altLang="en-US"/>
           </a:p>
@@ -3089,7 +3094,7 @@
         <p:spPr>
           <a:xfrm>
             <a:off x="2518995" y="1239716"/>
-            <a:ext cx="2294793" cy="369332"/>
+            <a:ext cx="2457451" cy="369332"/>
           </a:xfrm>
           <a:prstGeom prst="rect">
             <a:avLst/>
@@ -3103,8 +3108,24 @@
           <a:lstStyle/>
           <a:p>
             <a:r>
+              <a:rPr lang="zh-CN" altLang="en-US" dirty="0" smtClean="0"/>
+              <a:t>优化</a:t>
+            </a:r>
+            <a:r>
               <a:rPr lang="en-US" altLang="zh-CN" dirty="0" smtClean="0"/>
-              <a:t>Optimized to original</a:t>
+              <a:t>RSD</a:t>
+            </a:r>
+            <a:r>
+              <a:rPr lang="en-US" altLang="zh-CN" dirty="0" smtClean="0"/>
+              <a:t> vs. </a:t>
+            </a:r>
+            <a:r>
+              <a:rPr lang="zh-CN" altLang="en-US" dirty="0" smtClean="0"/>
+              <a:t>原始</a:t>
+            </a:r>
+            <a:r>
+              <a:rPr lang="en-US" altLang="zh-CN" dirty="0" smtClean="0"/>
+              <a:t>RSD</a:t>
             </a:r>
             <a:endParaRPr lang="zh-CN" altLang="en-US" dirty="0"/>
           </a:p>
@@ -3119,7 +3140,7 @@
         <p:spPr>
           <a:xfrm>
             <a:off x="6396402" y="1239716"/>
-            <a:ext cx="2294793" cy="369332"/>
+            <a:ext cx="2351944" cy="369332"/>
           </a:xfrm>
           <a:prstGeom prst="rect">
             <a:avLst/>
@@ -3133,8 +3154,20 @@
           <a:lstStyle/>
           <a:p>
             <a:r>
+              <a:rPr lang="zh-CN" altLang="en-US" dirty="0" smtClean="0"/>
+              <a:t>硬件实现</a:t>
+            </a:r>
+            <a:r>
               <a:rPr lang="en-US" altLang="zh-CN" dirty="0" smtClean="0"/>
-              <a:t>Hardware to original</a:t>
+              <a:t> vs. </a:t>
+            </a:r>
+            <a:r>
+              <a:rPr lang="zh-CN" altLang="en-US" dirty="0" smtClean="0"/>
+              <a:t>原始</a:t>
+            </a:r>
+            <a:r>
+              <a:rPr lang="en-US" altLang="zh-CN" dirty="0" smtClean="0"/>
+              <a:t>RSD</a:t>
             </a:r>
             <a:endParaRPr lang="zh-CN" altLang="en-US" dirty="0"/>
           </a:p>
@@ -3150,6 +3183,13 @@
   <p:clrMapOvr>
     <a:masterClrMapping/>
   </p:clrMapOvr>
+  <p:timing>
+    <p:tnLst>
+      <p:par>
+        <p:cTn id="1" dur="indefinite" restart="never" nodeType="tmRoot"/>
+      </p:par>
+    </p:tnLst>
+  </p:timing>
 </p:sld>
 </file>
 
@@ -3284,14 +3324,14 @@
       </p:sp>
       <p:sp>
         <p:nvSpPr>
-          <p:cNvPr id="6" name="文本框 5"/>
+          <p:cNvPr id="8" name="文本框 7"/>
           <p:cNvSpPr txBox="1"/>
           <p:nvPr/>
         </p:nvSpPr>
         <p:spPr>
           <a:xfrm>
             <a:off x="2518995" y="1239716"/>
-            <a:ext cx="2294793" cy="369332"/>
+            <a:ext cx="2457451" cy="369332"/>
           </a:xfrm>
           <a:prstGeom prst="rect">
             <a:avLst/>
@@ -3305,8 +3345,24 @@
           <a:lstStyle/>
           <a:p>
             <a:r>
+              <a:rPr lang="zh-CN" altLang="en-US" dirty="0" smtClean="0"/>
+              <a:t>优化</a:t>
+            </a:r>
+            <a:r>
               <a:rPr lang="en-US" altLang="zh-CN" dirty="0" smtClean="0"/>
-              <a:t>Optimized to original</a:t>
+              <a:t>RSD</a:t>
+            </a:r>
+            <a:r>
+              <a:rPr lang="en-US" altLang="zh-CN" dirty="0" smtClean="0"/>
+              <a:t> vs. </a:t>
+            </a:r>
+            <a:r>
+              <a:rPr lang="zh-CN" altLang="en-US" dirty="0" smtClean="0"/>
+              <a:t>原始</a:t>
+            </a:r>
+            <a:r>
+              <a:rPr lang="en-US" altLang="zh-CN" dirty="0" smtClean="0"/>
+              <a:t>RSD</a:t>
             </a:r>
             <a:endParaRPr lang="zh-CN" altLang="en-US" dirty="0"/>
           </a:p>
@@ -3314,14 +3370,14 @@
       </p:sp>
       <p:sp>
         <p:nvSpPr>
-          <p:cNvPr id="7" name="文本框 6"/>
+          <p:cNvPr id="9" name="文本框 8"/>
           <p:cNvSpPr txBox="1"/>
           <p:nvPr/>
         </p:nvSpPr>
         <p:spPr>
           <a:xfrm>
             <a:off x="6396402" y="1239716"/>
-            <a:ext cx="2294793" cy="369332"/>
+            <a:ext cx="2351944" cy="369332"/>
           </a:xfrm>
           <a:prstGeom prst="rect">
             <a:avLst/>
@@ -3335,8 +3391,20 @@
           <a:lstStyle/>
           <a:p>
             <a:r>
+              <a:rPr lang="zh-CN" altLang="en-US" dirty="0" smtClean="0"/>
+              <a:t>硬件实现</a:t>
+            </a:r>
+            <a:r>
               <a:rPr lang="en-US" altLang="zh-CN" dirty="0" smtClean="0"/>
-              <a:t>Hardware to original</a:t>
+              <a:t> vs. </a:t>
+            </a:r>
+            <a:r>
+              <a:rPr lang="zh-CN" altLang="en-US" dirty="0" smtClean="0"/>
+              <a:t>原始</a:t>
+            </a:r>
+            <a:r>
+              <a:rPr lang="en-US" altLang="zh-CN" dirty="0" smtClean="0"/>
+              <a:t>RSD</a:t>
             </a:r>
             <a:endParaRPr lang="zh-CN" altLang="en-US" dirty="0"/>
           </a:p>
@@ -3486,14 +3554,14 @@
       </p:sp>
       <p:sp>
         <p:nvSpPr>
-          <p:cNvPr id="6" name="文本框 5"/>
+          <p:cNvPr id="8" name="文本框 7"/>
           <p:cNvSpPr txBox="1"/>
           <p:nvPr/>
         </p:nvSpPr>
         <p:spPr>
           <a:xfrm>
             <a:off x="2518995" y="1239716"/>
-            <a:ext cx="2294793" cy="369332"/>
+            <a:ext cx="2457451" cy="369332"/>
           </a:xfrm>
           <a:prstGeom prst="rect">
             <a:avLst/>
@@ -3507,8 +3575,24 @@
           <a:lstStyle/>
           <a:p>
             <a:r>
+              <a:rPr lang="zh-CN" altLang="en-US" dirty="0" smtClean="0"/>
+              <a:t>优化</a:t>
+            </a:r>
+            <a:r>
               <a:rPr lang="en-US" altLang="zh-CN" dirty="0" smtClean="0"/>
-              <a:t>Optimized to original</a:t>
+              <a:t>RSD</a:t>
+            </a:r>
+            <a:r>
+              <a:rPr lang="en-US" altLang="zh-CN" dirty="0" smtClean="0"/>
+              <a:t> vs. </a:t>
+            </a:r>
+            <a:r>
+              <a:rPr lang="zh-CN" altLang="en-US" dirty="0" smtClean="0"/>
+              <a:t>原始</a:t>
+            </a:r>
+            <a:r>
+              <a:rPr lang="en-US" altLang="zh-CN" dirty="0" smtClean="0"/>
+              <a:t>RSD</a:t>
             </a:r>
             <a:endParaRPr lang="zh-CN" altLang="en-US" dirty="0"/>
           </a:p>
@@ -3516,14 +3600,14 @@
       </p:sp>
       <p:sp>
         <p:nvSpPr>
-          <p:cNvPr id="7" name="文本框 6"/>
+          <p:cNvPr id="9" name="文本框 8"/>
           <p:cNvSpPr txBox="1"/>
           <p:nvPr/>
         </p:nvSpPr>
         <p:spPr>
           <a:xfrm>
             <a:off x="6396402" y="1239716"/>
-            <a:ext cx="2294793" cy="369332"/>
+            <a:ext cx="2351944" cy="369332"/>
           </a:xfrm>
           <a:prstGeom prst="rect">
             <a:avLst/>
@@ -3537,8 +3621,20 @@
           <a:lstStyle/>
           <a:p>
             <a:r>
+              <a:rPr lang="zh-CN" altLang="en-US" dirty="0" smtClean="0"/>
+              <a:t>硬件实现</a:t>
+            </a:r>
+            <a:r>
               <a:rPr lang="en-US" altLang="zh-CN" dirty="0" smtClean="0"/>
-              <a:t>Hardware to original</a:t>
+              <a:t> vs. </a:t>
+            </a:r>
+            <a:r>
+              <a:rPr lang="zh-CN" altLang="en-US" dirty="0" smtClean="0"/>
+              <a:t>原始</a:t>
+            </a:r>
+            <a:r>
+              <a:rPr lang="en-US" altLang="zh-CN" dirty="0" smtClean="0"/>
+              <a:t>RSD</a:t>
             </a:r>
             <a:endParaRPr lang="zh-CN" altLang="en-US" dirty="0"/>
           </a:p>
@@ -3688,14 +3784,14 @@
       </p:sp>
       <p:sp>
         <p:nvSpPr>
-          <p:cNvPr id="6" name="文本框 5"/>
+          <p:cNvPr id="8" name="文本框 7"/>
           <p:cNvSpPr txBox="1"/>
           <p:nvPr/>
         </p:nvSpPr>
         <p:spPr>
           <a:xfrm>
             <a:off x="2518995" y="1239716"/>
-            <a:ext cx="2294793" cy="369332"/>
+            <a:ext cx="2457451" cy="369332"/>
           </a:xfrm>
           <a:prstGeom prst="rect">
             <a:avLst/>
@@ -3709,8 +3805,24 @@
           <a:lstStyle/>
           <a:p>
             <a:r>
+              <a:rPr lang="zh-CN" altLang="en-US" dirty="0" smtClean="0"/>
+              <a:t>优化</a:t>
+            </a:r>
+            <a:r>
               <a:rPr lang="en-US" altLang="zh-CN" dirty="0" smtClean="0"/>
-              <a:t>Optimized to original</a:t>
+              <a:t>RSD</a:t>
+            </a:r>
+            <a:r>
+              <a:rPr lang="en-US" altLang="zh-CN" dirty="0" smtClean="0"/>
+              <a:t> vs. </a:t>
+            </a:r>
+            <a:r>
+              <a:rPr lang="zh-CN" altLang="en-US" dirty="0" smtClean="0"/>
+              <a:t>原始</a:t>
+            </a:r>
+            <a:r>
+              <a:rPr lang="en-US" altLang="zh-CN" dirty="0" smtClean="0"/>
+              <a:t>RSD</a:t>
             </a:r>
             <a:endParaRPr lang="zh-CN" altLang="en-US" dirty="0"/>
           </a:p>
@@ -3718,14 +3830,14 @@
       </p:sp>
       <p:sp>
         <p:nvSpPr>
-          <p:cNvPr id="7" name="文本框 6"/>
+          <p:cNvPr id="9" name="文本框 8"/>
           <p:cNvSpPr txBox="1"/>
           <p:nvPr/>
         </p:nvSpPr>
         <p:spPr>
           <a:xfrm>
             <a:off x="6396402" y="1239716"/>
-            <a:ext cx="2294793" cy="369332"/>
+            <a:ext cx="2351944" cy="369332"/>
           </a:xfrm>
           <a:prstGeom prst="rect">
             <a:avLst/>
@@ -3739,8 +3851,20 @@
           <a:lstStyle/>
           <a:p>
             <a:r>
+              <a:rPr lang="zh-CN" altLang="en-US" dirty="0" smtClean="0"/>
+              <a:t>硬件实现</a:t>
+            </a:r>
+            <a:r>
               <a:rPr lang="en-US" altLang="zh-CN" dirty="0" smtClean="0"/>
-              <a:t>Hardware to original</a:t>
+              <a:t> vs. </a:t>
+            </a:r>
+            <a:r>
+              <a:rPr lang="zh-CN" altLang="en-US" dirty="0" smtClean="0"/>
+              <a:t>原始</a:t>
+            </a:r>
+            <a:r>
+              <a:rPr lang="en-US" altLang="zh-CN" dirty="0" smtClean="0"/>
+              <a:t>RSD</a:t>
             </a:r>
             <a:endParaRPr lang="zh-CN" altLang="en-US" dirty="0"/>
           </a:p>
@@ -3890,14 +4014,14 @@
       </p:sp>
       <p:sp>
         <p:nvSpPr>
-          <p:cNvPr id="6" name="文本框 5"/>
+          <p:cNvPr id="8" name="文本框 7"/>
           <p:cNvSpPr txBox="1"/>
           <p:nvPr/>
         </p:nvSpPr>
         <p:spPr>
           <a:xfrm>
             <a:off x="2518995" y="1239716"/>
-            <a:ext cx="2294793" cy="369332"/>
+            <a:ext cx="2457451" cy="369332"/>
           </a:xfrm>
           <a:prstGeom prst="rect">
             <a:avLst/>
@@ -3911,8 +4035,24 @@
           <a:lstStyle/>
           <a:p>
             <a:r>
+              <a:rPr lang="zh-CN" altLang="en-US" dirty="0" smtClean="0"/>
+              <a:t>优化</a:t>
+            </a:r>
+            <a:r>
               <a:rPr lang="en-US" altLang="zh-CN" dirty="0" smtClean="0"/>
-              <a:t>Optimized to original</a:t>
+              <a:t>RSD</a:t>
+            </a:r>
+            <a:r>
+              <a:rPr lang="en-US" altLang="zh-CN" dirty="0" smtClean="0"/>
+              <a:t> vs. </a:t>
+            </a:r>
+            <a:r>
+              <a:rPr lang="zh-CN" altLang="en-US" dirty="0" smtClean="0"/>
+              <a:t>原始</a:t>
+            </a:r>
+            <a:r>
+              <a:rPr lang="en-US" altLang="zh-CN" dirty="0" smtClean="0"/>
+              <a:t>RSD</a:t>
             </a:r>
             <a:endParaRPr lang="zh-CN" altLang="en-US" dirty="0"/>
           </a:p>
@@ -3920,14 +4060,14 @@
       </p:sp>
       <p:sp>
         <p:nvSpPr>
-          <p:cNvPr id="7" name="文本框 6"/>
+          <p:cNvPr id="9" name="文本框 8"/>
           <p:cNvSpPr txBox="1"/>
           <p:nvPr/>
         </p:nvSpPr>
         <p:spPr>
           <a:xfrm>
             <a:off x="6396402" y="1239716"/>
-            <a:ext cx="2294793" cy="369332"/>
+            <a:ext cx="2351944" cy="369332"/>
           </a:xfrm>
           <a:prstGeom prst="rect">
             <a:avLst/>
@@ -3941,8 +4081,20 @@
           <a:lstStyle/>
           <a:p>
             <a:r>
+              <a:rPr lang="zh-CN" altLang="en-US" dirty="0" smtClean="0"/>
+              <a:t>硬件实现</a:t>
+            </a:r>
+            <a:r>
               <a:rPr lang="en-US" altLang="zh-CN" dirty="0" smtClean="0"/>
-              <a:t>Hardware to original</a:t>
+              <a:t> vs. </a:t>
+            </a:r>
+            <a:r>
+              <a:rPr lang="zh-CN" altLang="en-US" dirty="0" smtClean="0"/>
+              <a:t>原始</a:t>
+            </a:r>
+            <a:r>
+              <a:rPr lang="en-US" altLang="zh-CN" dirty="0" smtClean="0"/>
+              <a:t>RSD</a:t>
             </a:r>
             <a:endParaRPr lang="zh-CN" altLang="en-US" dirty="0"/>
           </a:p>

</xml_diff>